<commit_message>
Semicolon + criterion mistakes resolved
</commit_message>
<xml_diff>
--- a/ch04_datasets/figures/CorpusDataset_Stats.pptx
+++ b/ch04_datasets/figures/CorpusDataset_Stats.pptx
@@ -265,7 +265,7 @@
           <a:p>
             <a:fld id="{BEBD7BDA-03A1-4D4C-8414-F15750B47982}" type="datetimeFigureOut">
               <a:rPr lang="en-US" smtClean="0"/>
-              <a:t>9/18/16</a:t>
+              <a:t>9/28/16</a:t>
             </a:fld>
             <a:endParaRPr lang="en-US"/>
           </a:p>
@@ -435,7 +435,7 @@
           <a:p>
             <a:fld id="{BEBD7BDA-03A1-4D4C-8414-F15750B47982}" type="datetimeFigureOut">
               <a:rPr lang="en-US" smtClean="0"/>
-              <a:t>9/18/16</a:t>
+              <a:t>9/28/16</a:t>
             </a:fld>
             <a:endParaRPr lang="en-US"/>
           </a:p>
@@ -615,7 +615,7 @@
           <a:p>
             <a:fld id="{BEBD7BDA-03A1-4D4C-8414-F15750B47982}" type="datetimeFigureOut">
               <a:rPr lang="en-US" smtClean="0"/>
-              <a:t>9/18/16</a:t>
+              <a:t>9/28/16</a:t>
             </a:fld>
             <a:endParaRPr lang="en-US"/>
           </a:p>
@@ -785,7 +785,7 @@
           <a:p>
             <a:fld id="{BEBD7BDA-03A1-4D4C-8414-F15750B47982}" type="datetimeFigureOut">
               <a:rPr lang="en-US" smtClean="0"/>
-              <a:t>9/18/16</a:t>
+              <a:t>9/28/16</a:t>
             </a:fld>
             <a:endParaRPr lang="en-US"/>
           </a:p>
@@ -1031,7 +1031,7 @@
           <a:p>
             <a:fld id="{BEBD7BDA-03A1-4D4C-8414-F15750B47982}" type="datetimeFigureOut">
               <a:rPr lang="en-US" smtClean="0"/>
-              <a:t>9/18/16</a:t>
+              <a:t>9/28/16</a:t>
             </a:fld>
             <a:endParaRPr lang="en-US"/>
           </a:p>
@@ -1263,7 +1263,7 @@
           <a:p>
             <a:fld id="{BEBD7BDA-03A1-4D4C-8414-F15750B47982}" type="datetimeFigureOut">
               <a:rPr lang="en-US" smtClean="0"/>
-              <a:t>9/18/16</a:t>
+              <a:t>9/28/16</a:t>
             </a:fld>
             <a:endParaRPr lang="en-US"/>
           </a:p>
@@ -1630,7 +1630,7 @@
           <a:p>
             <a:fld id="{BEBD7BDA-03A1-4D4C-8414-F15750B47982}" type="datetimeFigureOut">
               <a:rPr lang="en-US" smtClean="0"/>
-              <a:t>9/18/16</a:t>
+              <a:t>9/28/16</a:t>
             </a:fld>
             <a:endParaRPr lang="en-US"/>
           </a:p>
@@ -1748,7 +1748,7 @@
           <a:p>
             <a:fld id="{BEBD7BDA-03A1-4D4C-8414-F15750B47982}" type="datetimeFigureOut">
               <a:rPr lang="en-US" smtClean="0"/>
-              <a:t>9/18/16</a:t>
+              <a:t>9/28/16</a:t>
             </a:fld>
             <a:endParaRPr lang="en-US"/>
           </a:p>
@@ -1843,7 +1843,7 @@
           <a:p>
             <a:fld id="{BEBD7BDA-03A1-4D4C-8414-F15750B47982}" type="datetimeFigureOut">
               <a:rPr lang="en-US" smtClean="0"/>
-              <a:t>9/18/16</a:t>
+              <a:t>9/28/16</a:t>
             </a:fld>
             <a:endParaRPr lang="en-US"/>
           </a:p>
@@ -2120,7 +2120,7 @@
           <a:p>
             <a:fld id="{BEBD7BDA-03A1-4D4C-8414-F15750B47982}" type="datetimeFigureOut">
               <a:rPr lang="en-US" smtClean="0"/>
-              <a:t>9/18/16</a:t>
+              <a:t>9/28/16</a:t>
             </a:fld>
             <a:endParaRPr lang="en-US"/>
           </a:p>
@@ -2373,7 +2373,7 @@
           <a:p>
             <a:fld id="{BEBD7BDA-03A1-4D4C-8414-F15750B47982}" type="datetimeFigureOut">
               <a:rPr lang="en-US" smtClean="0"/>
-              <a:t>9/18/16</a:t>
+              <a:t>9/28/16</a:t>
             </a:fld>
             <a:endParaRPr lang="en-US"/>
           </a:p>
@@ -2586,7 +2586,7 @@
           <a:p>
             <a:fld id="{BEBD7BDA-03A1-4D4C-8414-F15750B47982}" type="datetimeFigureOut">
               <a:rPr lang="en-US" smtClean="0"/>
-              <a:t>9/18/16</a:t>
+              <a:t>9/28/16</a:t>
             </a:fld>
             <a:endParaRPr lang="en-US"/>
           </a:p>
@@ -8500,8 +8500,16 @@
                 <a:ea typeface="Times New Roman" charset="0"/>
                 <a:cs typeface="Times New Roman" charset="0"/>
               </a:rPr>
-              <a:t>Concerts</a:t>
-            </a:r>
+              <a:t>Releases</a:t>
+            </a:r>
+            <a:endParaRPr lang="en-US" b="1" dirty="0" smtClean="0">
+              <a:solidFill>
+                <a:schemeClr val="tx1"/>
+              </a:solidFill>
+              <a:latin typeface="Times New Roman" charset="0"/>
+              <a:ea typeface="Times New Roman" charset="0"/>
+              <a:cs typeface="Times New Roman" charset="0"/>
+            </a:endParaRPr>
           </a:p>
           <a:p>
             <a:pPr algn="ctr"/>
@@ -9514,6 +9522,17 @@
           <a:p>
             <a:pPr algn="ctr"/>
             <a:r>
+              <a:rPr lang="en-US" b="1" dirty="0">
+                <a:solidFill>
+                  <a:schemeClr val="tx1"/>
+                </a:solidFill>
+                <a:latin typeface="Times New Roman" charset="0"/>
+                <a:ea typeface="Times New Roman" charset="0"/>
+                <a:cs typeface="Times New Roman" charset="0"/>
+              </a:rPr>
+              <a:t>R</a:t>
+            </a:r>
+            <a:r>
               <a:rPr lang="en-US" b="1" dirty="0" smtClean="0">
                 <a:solidFill>
                   <a:schemeClr val="tx1"/>
@@ -9522,8 +9541,16 @@
                 <a:ea typeface="Times New Roman" charset="0"/>
                 <a:cs typeface="Times New Roman" charset="0"/>
               </a:rPr>
-              <a:t>Concerts</a:t>
-            </a:r>
+              <a:t>eleases</a:t>
+            </a:r>
+            <a:endParaRPr lang="en-US" b="1" dirty="0" smtClean="0">
+              <a:solidFill>
+                <a:schemeClr val="tx1"/>
+              </a:solidFill>
+              <a:latin typeface="Times New Roman" charset="0"/>
+              <a:ea typeface="Times New Roman" charset="0"/>
+              <a:cs typeface="Times New Roman" charset="0"/>
+            </a:endParaRPr>
           </a:p>
           <a:p>
             <a:pPr algn="ctr"/>
@@ -11578,8 +11605,16 @@
                 <a:ea typeface="Times New Roman" charset="0"/>
                 <a:cs typeface="Times New Roman" charset="0"/>
               </a:rPr>
-              <a:t>Concerts</a:t>
-            </a:r>
+              <a:t>Releases</a:t>
+            </a:r>
+            <a:endParaRPr lang="en-US" b="1" dirty="0" smtClean="0">
+              <a:solidFill>
+                <a:schemeClr val="tx1"/>
+              </a:solidFill>
+              <a:latin typeface="Times New Roman" charset="0"/>
+              <a:ea typeface="Times New Roman" charset="0"/>
+              <a:cs typeface="Times New Roman" charset="0"/>
+            </a:endParaRPr>
           </a:p>
           <a:p>
             <a:pPr algn="ctr"/>
@@ -13690,8 +13725,15 @@
                 <a:latin typeface="Times New Roman"/>
                 <a:cs typeface="Times New Roman"/>
               </a:rPr>
-              <a:t>Concerts</a:t>
-            </a:r>
+              <a:t>Releases</a:t>
+            </a:r>
+            <a:endParaRPr lang="en-US" sz="1400" b="1" dirty="0" smtClean="0">
+              <a:solidFill>
+                <a:srgbClr val="000000"/>
+              </a:solidFill>
+              <a:latin typeface="Times New Roman"/>
+              <a:cs typeface="Times New Roman"/>
+            </a:endParaRPr>
           </a:p>
           <a:p>
             <a:pPr algn="ctr"/>

</xml_diff>